<commit_message>
Revert "Update Presentation .pptx"
This reverts commit 2d10c9acf58cda988303124232ede01f8d4ef10f.
</commit_message>
<xml_diff>
--- a/SRS/Presentation .pptx
+++ b/SRS/Presentation .pptx
@@ -9388,6 +9388,25 @@
           </a:p>
         </p:txBody>
       </p:sp>
+      <p:sp>
+        <p:nvSpPr>
+          <p:cNvPr id="3" name="Subtitle 2"/>
+          <p:cNvSpPr>
+            <a:spLocks noGrp="1"/>
+          </p:cNvSpPr>
+          <p:nvPr>
+            <p:ph type="subTitle"/>
+          </p:nvPr>
+        </p:nvSpPr>
+        <p:spPr/>
+        <p:txBody>
+          <a:bodyPr/>
+          <a:lstStyle/>
+          <a:p>
+            <a:endParaRPr lang="en-US"/>
+          </a:p>
+        </p:txBody>
+      </p:sp>
       <p:pic>
         <p:nvPicPr>
           <p:cNvPr id="4" name="Picture 3"/>
@@ -9475,6 +9494,25 @@
               <a:t>Block diagram</a:t>
             </a:r>
             <a:endParaRPr lang="en-US" dirty="0"/>
+          </a:p>
+        </p:txBody>
+      </p:sp>
+      <p:sp>
+        <p:nvSpPr>
+          <p:cNvPr id="3" name="Subtitle 2"/>
+          <p:cNvSpPr>
+            <a:spLocks noGrp="1"/>
+          </p:cNvSpPr>
+          <p:nvPr>
+            <p:ph type="subTitle"/>
+          </p:nvPr>
+        </p:nvSpPr>
+        <p:spPr/>
+        <p:txBody>
+          <a:bodyPr/>
+          <a:lstStyle/>
+          <a:p>
+            <a:endParaRPr lang="en-US"/>
           </a:p>
         </p:txBody>
       </p:sp>

</xml_diff>

<commit_message>
Revert "Revert "Update Presentation .pptx""
This reverts commit 0cbcff7bfa2ed074e6b3894a4950f54e982e75ef.
</commit_message>
<xml_diff>
--- a/SRS/Presentation .pptx
+++ b/SRS/Presentation .pptx
@@ -9388,25 +9388,6 @@
           </a:p>
         </p:txBody>
       </p:sp>
-      <p:sp>
-        <p:nvSpPr>
-          <p:cNvPr id="3" name="Subtitle 2"/>
-          <p:cNvSpPr>
-            <a:spLocks noGrp="1"/>
-          </p:cNvSpPr>
-          <p:nvPr>
-            <p:ph type="subTitle"/>
-          </p:nvPr>
-        </p:nvSpPr>
-        <p:spPr/>
-        <p:txBody>
-          <a:bodyPr/>
-          <a:lstStyle/>
-          <a:p>
-            <a:endParaRPr lang="en-US"/>
-          </a:p>
-        </p:txBody>
-      </p:sp>
       <p:pic>
         <p:nvPicPr>
           <p:cNvPr id="4" name="Picture 3"/>
@@ -9494,25 +9475,6 @@
               <a:t>Block diagram</a:t>
             </a:r>
             <a:endParaRPr lang="en-US" dirty="0"/>
-          </a:p>
-        </p:txBody>
-      </p:sp>
-      <p:sp>
-        <p:nvSpPr>
-          <p:cNvPr id="3" name="Subtitle 2"/>
-          <p:cNvSpPr>
-            <a:spLocks noGrp="1"/>
-          </p:cNvSpPr>
-          <p:nvPr>
-            <p:ph type="subTitle"/>
-          </p:nvPr>
-        </p:nvSpPr>
-        <p:spPr/>
-        <p:txBody>
-          <a:bodyPr/>
-          <a:lstStyle/>
-          <a:p>
-            <a:endParaRPr lang="en-US"/>
           </a:p>
         </p:txBody>
       </p:sp>

</xml_diff>